<commit_message>
Added code to estimate network confidence
</commit_message>
<xml_diff>
--- a/documentation/network settup.pptx
+++ b/documentation/network settup.pptx
@@ -104,6 +104,11 @@
       </a:defRPr>
     </a:lvl9pPr>
   </p:defaultTextStyle>
+  <p:extLst>
+    <p:ext uri="{EFAFB233-063F-42B5-8137-9DF3F51BA10A}">
+      <p15:sldGuideLst xmlns:p15="http://schemas.microsoft.com/office/powerpoint/2012/main"/>
+    </p:ext>
+  </p:extLst>
 </p:presentation>
 </file>
 
@@ -254,7 +259,7 @@
           <a:p>
             <a:fld id="{901573CB-0B24-4334-808C-FF135383C227}" type="datetimeFigureOut">
               <a:rPr lang="en-US" smtClean="0"/>
-              <a:t>3/21/2019</a:t>
+              <a:t>4/19/2019</a:t>
             </a:fld>
             <a:endParaRPr lang="en-US"/>
           </a:p>
@@ -452,7 +457,7 @@
           <a:p>
             <a:fld id="{901573CB-0B24-4334-808C-FF135383C227}" type="datetimeFigureOut">
               <a:rPr lang="en-US" smtClean="0"/>
-              <a:t>3/21/2019</a:t>
+              <a:t>4/19/2019</a:t>
             </a:fld>
             <a:endParaRPr lang="en-US"/>
           </a:p>
@@ -660,7 +665,7 @@
           <a:p>
             <a:fld id="{901573CB-0B24-4334-808C-FF135383C227}" type="datetimeFigureOut">
               <a:rPr lang="en-US" smtClean="0"/>
-              <a:t>3/21/2019</a:t>
+              <a:t>4/19/2019</a:t>
             </a:fld>
             <a:endParaRPr lang="en-US"/>
           </a:p>
@@ -858,7 +863,7 @@
           <a:p>
             <a:fld id="{901573CB-0B24-4334-808C-FF135383C227}" type="datetimeFigureOut">
               <a:rPr lang="en-US" smtClean="0"/>
-              <a:t>3/21/2019</a:t>
+              <a:t>4/19/2019</a:t>
             </a:fld>
             <a:endParaRPr lang="en-US"/>
           </a:p>
@@ -1133,7 +1138,7 @@
           <a:p>
             <a:fld id="{901573CB-0B24-4334-808C-FF135383C227}" type="datetimeFigureOut">
               <a:rPr lang="en-US" smtClean="0"/>
-              <a:t>3/21/2019</a:t>
+              <a:t>4/19/2019</a:t>
             </a:fld>
             <a:endParaRPr lang="en-US"/>
           </a:p>
@@ -1398,7 +1403,7 @@
           <a:p>
             <a:fld id="{901573CB-0B24-4334-808C-FF135383C227}" type="datetimeFigureOut">
               <a:rPr lang="en-US" smtClean="0"/>
-              <a:t>3/21/2019</a:t>
+              <a:t>4/19/2019</a:t>
             </a:fld>
             <a:endParaRPr lang="en-US"/>
           </a:p>
@@ -1810,7 +1815,7 @@
           <a:p>
             <a:fld id="{901573CB-0B24-4334-808C-FF135383C227}" type="datetimeFigureOut">
               <a:rPr lang="en-US" smtClean="0"/>
-              <a:t>3/21/2019</a:t>
+              <a:t>4/19/2019</a:t>
             </a:fld>
             <a:endParaRPr lang="en-US"/>
           </a:p>
@@ -1951,7 +1956,7 @@
           <a:p>
             <a:fld id="{901573CB-0B24-4334-808C-FF135383C227}" type="datetimeFigureOut">
               <a:rPr lang="en-US" smtClean="0"/>
-              <a:t>3/21/2019</a:t>
+              <a:t>4/19/2019</a:t>
             </a:fld>
             <a:endParaRPr lang="en-US"/>
           </a:p>
@@ -2064,7 +2069,7 @@
           <a:p>
             <a:fld id="{901573CB-0B24-4334-808C-FF135383C227}" type="datetimeFigureOut">
               <a:rPr lang="en-US" smtClean="0"/>
-              <a:t>3/21/2019</a:t>
+              <a:t>4/19/2019</a:t>
             </a:fld>
             <a:endParaRPr lang="en-US"/>
           </a:p>
@@ -2375,7 +2380,7 @@
           <a:p>
             <a:fld id="{901573CB-0B24-4334-808C-FF135383C227}" type="datetimeFigureOut">
               <a:rPr lang="en-US" smtClean="0"/>
-              <a:t>3/21/2019</a:t>
+              <a:t>4/19/2019</a:t>
             </a:fld>
             <a:endParaRPr lang="en-US"/>
           </a:p>
@@ -2663,7 +2668,7 @@
           <a:p>
             <a:fld id="{901573CB-0B24-4334-808C-FF135383C227}" type="datetimeFigureOut">
               <a:rPr lang="en-US" smtClean="0"/>
-              <a:t>3/21/2019</a:t>
+              <a:t>4/19/2019</a:t>
             </a:fld>
             <a:endParaRPr lang="en-US"/>
           </a:p>
@@ -2904,7 +2909,7 @@
           <a:p>
             <a:fld id="{901573CB-0B24-4334-808C-FF135383C227}" type="datetimeFigureOut">
               <a:rPr lang="en-US" smtClean="0"/>
-              <a:t>3/21/2019</a:t>
+              <a:t>4/19/2019</a:t>
             </a:fld>
             <a:endParaRPr lang="en-US"/>
           </a:p>
@@ -3323,10 +3328,10 @@
       </p:grpSpPr>
       <p:sp>
         <p:nvSpPr>
-          <p:cNvPr id="20" name="Rectangle 19">
-            <a:extLst>
-              <a:ext uri="{FF2B5EF4-FFF2-40B4-BE49-F238E27FC236}">
-                <a16:creationId xmlns:a16="http://schemas.microsoft.com/office/drawing/2014/main" id="{0EFA4484-4B30-4495-AD3D-356B159A0753}"/>
+          <p:cNvPr id="31" name="Rectangle 30">
+            <a:extLst>
+              <a:ext uri="{FF2B5EF4-FFF2-40B4-BE49-F238E27FC236}">
+                <a16:creationId xmlns:a16="http://schemas.microsoft.com/office/drawing/2014/main" id="{3981C6A4-EAEF-4D61-BBD8-9A28B1763B0B}"/>
               </a:ext>
             </a:extLst>
           </p:cNvPr>
@@ -3335,145 +3340,7 @@
         </p:nvSpPr>
         <p:spPr>
           <a:xfrm>
-            <a:off x="4920008" y="2514185"/>
-            <a:ext cx="898272" cy="903384"/>
-          </a:xfrm>
-          <a:prstGeom prst="rect">
-            <a:avLst/>
-          </a:prstGeom>
-        </p:spPr>
-        <p:style>
-          <a:lnRef idx="2">
-            <a:schemeClr val="accent4">
-              <a:shade val="50000"/>
-            </a:schemeClr>
-          </a:lnRef>
-          <a:fillRef idx="1">
-            <a:schemeClr val="accent4"/>
-          </a:fillRef>
-          <a:effectRef idx="0">
-            <a:schemeClr val="accent4"/>
-          </a:effectRef>
-          <a:fontRef idx="minor">
-            <a:schemeClr val="lt1"/>
-          </a:fontRef>
-        </p:style>
-        <p:txBody>
-          <a:bodyPr rtlCol="0" anchor="ctr"/>
-          <a:lstStyle/>
-          <a:p>
-            <a:pPr algn="ctr"/>
-            <a:endParaRPr lang="en-US" dirty="0"/>
-          </a:p>
-        </p:txBody>
-      </p:sp>
-      <p:sp>
-        <p:nvSpPr>
-          <p:cNvPr id="21" name="Rectangle 20">
-            <a:extLst>
-              <a:ext uri="{FF2B5EF4-FFF2-40B4-BE49-F238E27FC236}">
-                <a16:creationId xmlns:a16="http://schemas.microsoft.com/office/drawing/2014/main" id="{EB9A8C6F-DCC2-4D81-8EE6-7B977F4D4884}"/>
-              </a:ext>
-            </a:extLst>
-          </p:cNvPr>
-          <p:cNvSpPr/>
-          <p:nvPr/>
-        </p:nvSpPr>
-        <p:spPr>
-          <a:xfrm>
-            <a:off x="4813739" y="2627551"/>
-            <a:ext cx="898272" cy="903384"/>
-          </a:xfrm>
-          <a:prstGeom prst="rect">
-            <a:avLst/>
-          </a:prstGeom>
-        </p:spPr>
-        <p:style>
-          <a:lnRef idx="2">
-            <a:schemeClr val="accent4">
-              <a:shade val="50000"/>
-            </a:schemeClr>
-          </a:lnRef>
-          <a:fillRef idx="1">
-            <a:schemeClr val="accent4"/>
-          </a:fillRef>
-          <a:effectRef idx="0">
-            <a:schemeClr val="accent4"/>
-          </a:effectRef>
-          <a:fontRef idx="minor">
-            <a:schemeClr val="lt1"/>
-          </a:fontRef>
-        </p:style>
-        <p:txBody>
-          <a:bodyPr rtlCol="0" anchor="ctr"/>
-          <a:lstStyle/>
-          <a:p>
-            <a:pPr algn="ctr"/>
-            <a:endParaRPr lang="en-US"/>
-          </a:p>
-        </p:txBody>
-      </p:sp>
-      <p:sp>
-        <p:nvSpPr>
-          <p:cNvPr id="43" name="Arrow: Right 42">
-            <a:extLst>
-              <a:ext uri="{FF2B5EF4-FFF2-40B4-BE49-F238E27FC236}">
-                <a16:creationId xmlns:a16="http://schemas.microsoft.com/office/drawing/2014/main" id="{7D681486-59F5-424F-A5A8-090CDC3F84FA}"/>
-              </a:ext>
-            </a:extLst>
-          </p:cNvPr>
-          <p:cNvSpPr/>
-          <p:nvPr/>
-        </p:nvSpPr>
-        <p:spPr>
-          <a:xfrm>
-            <a:off x="5340260" y="2715629"/>
-            <a:ext cx="1395943" cy="903384"/>
-          </a:xfrm>
-          <a:prstGeom prst="rightArrow">
-            <a:avLst/>
-          </a:prstGeom>
-        </p:spPr>
-        <p:style>
-          <a:lnRef idx="2">
-            <a:schemeClr val="accent1">
-              <a:shade val="50000"/>
-            </a:schemeClr>
-          </a:lnRef>
-          <a:fillRef idx="1">
-            <a:schemeClr val="accent1"/>
-          </a:fillRef>
-          <a:effectRef idx="0">
-            <a:schemeClr val="accent1"/>
-          </a:effectRef>
-          <a:fontRef idx="minor">
-            <a:schemeClr val="lt1"/>
-          </a:fontRef>
-        </p:style>
-        <p:txBody>
-          <a:bodyPr rtlCol="0" anchor="ctr"/>
-          <a:lstStyle/>
-          <a:p>
-            <a:pPr algn="ctr"/>
-            <a:endParaRPr lang="en-US"/>
-          </a:p>
-        </p:txBody>
-      </p:sp>
-      <p:sp>
-        <p:nvSpPr>
-          <p:cNvPr id="4" name="Rectangle 3">
-            <a:extLst>
-              <a:ext uri="{FF2B5EF4-FFF2-40B4-BE49-F238E27FC236}">
-                <a16:creationId xmlns:a16="http://schemas.microsoft.com/office/drawing/2014/main" id="{52192F4F-9A58-4B2F-BD5E-A733C768E8A0}"/>
-              </a:ext>
-            </a:extLst>
-          </p:cNvPr>
-          <p:cNvSpPr/>
-          <p:nvPr/>
-        </p:nvSpPr>
-        <p:spPr>
-          <a:xfrm>
-            <a:off x="820124" y="1554247"/>
+            <a:off x="7225540" y="1648956"/>
             <a:ext cx="2946662" cy="2946662"/>
           </a:xfrm>
           <a:prstGeom prst="rect">
@@ -3525,10 +3392,10 @@
       </p:sp>
       <p:sp>
         <p:nvSpPr>
-          <p:cNvPr id="5" name="Rectangle 4">
-            <a:extLst>
-              <a:ext uri="{FF2B5EF4-FFF2-40B4-BE49-F238E27FC236}">
-                <a16:creationId xmlns:a16="http://schemas.microsoft.com/office/drawing/2014/main" id="{9AC7708A-97AE-4209-B5D3-1FC01E3A6689}"/>
+          <p:cNvPr id="29" name="Rectangle 28">
+            <a:extLst>
+              <a:ext uri="{FF2B5EF4-FFF2-40B4-BE49-F238E27FC236}">
+                <a16:creationId xmlns:a16="http://schemas.microsoft.com/office/drawing/2014/main" id="{A25A2F0A-42F2-4AD7-94F1-3D260FC10F9E}"/>
               </a:ext>
             </a:extLst>
           </p:cNvPr>
@@ -3537,7 +3404,7 @@
         </p:nvSpPr>
         <p:spPr>
           <a:xfrm>
-            <a:off x="728365" y="1630052"/>
+            <a:off x="7106476" y="1739446"/>
             <a:ext cx="2946662" cy="2946662"/>
           </a:xfrm>
           <a:prstGeom prst="rect">
@@ -3589,10 +3456,10 @@
       </p:sp>
       <p:sp>
         <p:nvSpPr>
-          <p:cNvPr id="7" name="Rectangle 6">
-            <a:extLst>
-              <a:ext uri="{FF2B5EF4-FFF2-40B4-BE49-F238E27FC236}">
-                <a16:creationId xmlns:a16="http://schemas.microsoft.com/office/drawing/2014/main" id="{D673A9A5-AC5E-4237-A43C-181B9EE178CC}"/>
+          <p:cNvPr id="26" name="Rectangle 25">
+            <a:extLst>
+              <a:ext uri="{FF2B5EF4-FFF2-40B4-BE49-F238E27FC236}">
+                <a16:creationId xmlns:a16="http://schemas.microsoft.com/office/drawing/2014/main" id="{CF00B313-19BC-424E-82DF-583E5D695489}"/>
               </a:ext>
             </a:extLst>
           </p:cNvPr>
@@ -3601,7 +3468,7 @@
         </p:nvSpPr>
         <p:spPr>
           <a:xfrm>
-            <a:off x="656555" y="1701860"/>
+            <a:off x="6973126" y="1863278"/>
             <a:ext cx="2946662" cy="2946662"/>
           </a:xfrm>
           <a:prstGeom prst="rect">
@@ -3653,6 +3520,336 @@
       </p:sp>
       <p:sp>
         <p:nvSpPr>
+          <p:cNvPr id="20" name="Rectangle 19">
+            <a:extLst>
+              <a:ext uri="{FF2B5EF4-FFF2-40B4-BE49-F238E27FC236}">
+                <a16:creationId xmlns:a16="http://schemas.microsoft.com/office/drawing/2014/main" id="{0EFA4484-4B30-4495-AD3D-356B159A0753}"/>
+              </a:ext>
+            </a:extLst>
+          </p:cNvPr>
+          <p:cNvSpPr/>
+          <p:nvPr/>
+        </p:nvSpPr>
+        <p:spPr>
+          <a:xfrm>
+            <a:off x="4920008" y="2514185"/>
+            <a:ext cx="898272" cy="903384"/>
+          </a:xfrm>
+          <a:prstGeom prst="rect">
+            <a:avLst/>
+          </a:prstGeom>
+        </p:spPr>
+        <p:style>
+          <a:lnRef idx="2">
+            <a:schemeClr val="accent4">
+              <a:shade val="50000"/>
+            </a:schemeClr>
+          </a:lnRef>
+          <a:fillRef idx="1">
+            <a:schemeClr val="accent4"/>
+          </a:fillRef>
+          <a:effectRef idx="0">
+            <a:schemeClr val="accent4"/>
+          </a:effectRef>
+          <a:fontRef idx="minor">
+            <a:schemeClr val="lt1"/>
+          </a:fontRef>
+        </p:style>
+        <p:txBody>
+          <a:bodyPr rtlCol="0" anchor="ctr"/>
+          <a:lstStyle/>
+          <a:p>
+            <a:pPr algn="ctr"/>
+            <a:endParaRPr lang="en-US" dirty="0"/>
+          </a:p>
+        </p:txBody>
+      </p:sp>
+      <p:sp>
+        <p:nvSpPr>
+          <p:cNvPr id="21" name="Rectangle 20">
+            <a:extLst>
+              <a:ext uri="{FF2B5EF4-FFF2-40B4-BE49-F238E27FC236}">
+                <a16:creationId xmlns:a16="http://schemas.microsoft.com/office/drawing/2014/main" id="{EB9A8C6F-DCC2-4D81-8EE6-7B977F4D4884}"/>
+              </a:ext>
+            </a:extLst>
+          </p:cNvPr>
+          <p:cNvSpPr/>
+          <p:nvPr/>
+        </p:nvSpPr>
+        <p:spPr>
+          <a:xfrm>
+            <a:off x="4813739" y="2627551"/>
+            <a:ext cx="898272" cy="903384"/>
+          </a:xfrm>
+          <a:prstGeom prst="rect">
+            <a:avLst/>
+          </a:prstGeom>
+        </p:spPr>
+        <p:style>
+          <a:lnRef idx="2">
+            <a:schemeClr val="accent4">
+              <a:shade val="50000"/>
+            </a:schemeClr>
+          </a:lnRef>
+          <a:fillRef idx="1">
+            <a:schemeClr val="accent4"/>
+          </a:fillRef>
+          <a:effectRef idx="0">
+            <a:schemeClr val="accent4"/>
+          </a:effectRef>
+          <a:fontRef idx="minor">
+            <a:schemeClr val="lt1"/>
+          </a:fontRef>
+        </p:style>
+        <p:txBody>
+          <a:bodyPr rtlCol="0" anchor="ctr"/>
+          <a:lstStyle/>
+          <a:p>
+            <a:pPr algn="ctr"/>
+            <a:endParaRPr lang="en-US"/>
+          </a:p>
+        </p:txBody>
+      </p:sp>
+      <p:sp>
+        <p:nvSpPr>
+          <p:cNvPr id="43" name="Arrow: Right 42">
+            <a:extLst>
+              <a:ext uri="{FF2B5EF4-FFF2-40B4-BE49-F238E27FC236}">
+                <a16:creationId xmlns:a16="http://schemas.microsoft.com/office/drawing/2014/main" id="{7D681486-59F5-424F-A5A8-090CDC3F84FA}"/>
+              </a:ext>
+            </a:extLst>
+          </p:cNvPr>
+          <p:cNvSpPr/>
+          <p:nvPr/>
+        </p:nvSpPr>
+        <p:spPr>
+          <a:xfrm>
+            <a:off x="5340260" y="2715629"/>
+            <a:ext cx="1395943" cy="903384"/>
+          </a:xfrm>
+          <a:prstGeom prst="rightArrow">
+            <a:avLst/>
+          </a:prstGeom>
+        </p:spPr>
+        <p:style>
+          <a:lnRef idx="2">
+            <a:schemeClr val="accent1">
+              <a:shade val="50000"/>
+            </a:schemeClr>
+          </a:lnRef>
+          <a:fillRef idx="1">
+            <a:schemeClr val="accent1"/>
+          </a:fillRef>
+          <a:effectRef idx="0">
+            <a:schemeClr val="accent1"/>
+          </a:effectRef>
+          <a:fontRef idx="minor">
+            <a:schemeClr val="lt1"/>
+          </a:fontRef>
+        </p:style>
+        <p:txBody>
+          <a:bodyPr rtlCol="0" anchor="ctr"/>
+          <a:lstStyle/>
+          <a:p>
+            <a:pPr algn="ctr"/>
+            <a:endParaRPr lang="en-US"/>
+          </a:p>
+        </p:txBody>
+      </p:sp>
+      <p:sp>
+        <p:nvSpPr>
+          <p:cNvPr id="4" name="Rectangle 3">
+            <a:extLst>
+              <a:ext uri="{FF2B5EF4-FFF2-40B4-BE49-F238E27FC236}">
+                <a16:creationId xmlns:a16="http://schemas.microsoft.com/office/drawing/2014/main" id="{52192F4F-9A58-4B2F-BD5E-A733C768E8A0}"/>
+              </a:ext>
+            </a:extLst>
+          </p:cNvPr>
+          <p:cNvSpPr/>
+          <p:nvPr/>
+        </p:nvSpPr>
+        <p:spPr>
+          <a:xfrm>
+            <a:off x="820124" y="1554247"/>
+            <a:ext cx="2946662" cy="2946662"/>
+          </a:xfrm>
+          <a:prstGeom prst="rect">
+            <a:avLst/>
+          </a:prstGeom>
+          <a:blipFill dpi="0" rotWithShape="1">
+            <a:blip r:embed="rId3">
+              <a:extLst>
+                <a:ext uri="{28A0092B-C50C-407E-A947-70E740481C1C}">
+                  <a14:useLocalDpi xmlns:a14="http://schemas.microsoft.com/office/drawing/2010/main" val="0"/>
+                </a:ext>
+              </a:extLst>
+            </a:blip>
+            <a:srcRect/>
+            <a:stretch>
+              <a:fillRect/>
+            </a:stretch>
+          </a:blipFill>
+          <a:ln w="19050">
+            <a:solidFill>
+              <a:schemeClr val="tx1"/>
+            </a:solidFill>
+          </a:ln>
+        </p:spPr>
+        <p:style>
+          <a:lnRef idx="2">
+            <a:schemeClr val="accent1">
+              <a:shade val="50000"/>
+            </a:schemeClr>
+          </a:lnRef>
+          <a:fillRef idx="1">
+            <a:schemeClr val="accent1"/>
+          </a:fillRef>
+          <a:effectRef idx="0">
+            <a:schemeClr val="accent1"/>
+          </a:effectRef>
+          <a:fontRef idx="minor">
+            <a:schemeClr val="lt1"/>
+          </a:fontRef>
+        </p:style>
+        <p:txBody>
+          <a:bodyPr rtlCol="0" anchor="ctr"/>
+          <a:lstStyle/>
+          <a:p>
+            <a:pPr algn="ctr"/>
+            <a:endParaRPr lang="en-US"/>
+          </a:p>
+        </p:txBody>
+      </p:sp>
+      <p:sp>
+        <p:nvSpPr>
+          <p:cNvPr id="5" name="Rectangle 4">
+            <a:extLst>
+              <a:ext uri="{FF2B5EF4-FFF2-40B4-BE49-F238E27FC236}">
+                <a16:creationId xmlns:a16="http://schemas.microsoft.com/office/drawing/2014/main" id="{9AC7708A-97AE-4209-B5D3-1FC01E3A6689}"/>
+              </a:ext>
+            </a:extLst>
+          </p:cNvPr>
+          <p:cNvSpPr/>
+          <p:nvPr/>
+        </p:nvSpPr>
+        <p:spPr>
+          <a:xfrm>
+            <a:off x="728365" y="1630052"/>
+            <a:ext cx="2946662" cy="2946662"/>
+          </a:xfrm>
+          <a:prstGeom prst="rect">
+            <a:avLst/>
+          </a:prstGeom>
+          <a:blipFill dpi="0" rotWithShape="1">
+            <a:blip r:embed="rId3">
+              <a:extLst>
+                <a:ext uri="{28A0092B-C50C-407E-A947-70E740481C1C}">
+                  <a14:useLocalDpi xmlns:a14="http://schemas.microsoft.com/office/drawing/2010/main" val="0"/>
+                </a:ext>
+              </a:extLst>
+            </a:blip>
+            <a:srcRect/>
+            <a:stretch>
+              <a:fillRect/>
+            </a:stretch>
+          </a:blipFill>
+          <a:ln w="19050">
+            <a:solidFill>
+              <a:schemeClr val="tx1"/>
+            </a:solidFill>
+          </a:ln>
+        </p:spPr>
+        <p:style>
+          <a:lnRef idx="2">
+            <a:schemeClr val="accent1">
+              <a:shade val="50000"/>
+            </a:schemeClr>
+          </a:lnRef>
+          <a:fillRef idx="1">
+            <a:schemeClr val="accent1"/>
+          </a:fillRef>
+          <a:effectRef idx="0">
+            <a:schemeClr val="accent1"/>
+          </a:effectRef>
+          <a:fontRef idx="minor">
+            <a:schemeClr val="lt1"/>
+          </a:fontRef>
+        </p:style>
+        <p:txBody>
+          <a:bodyPr rtlCol="0" anchor="ctr"/>
+          <a:lstStyle/>
+          <a:p>
+            <a:pPr algn="ctr"/>
+            <a:endParaRPr lang="en-US"/>
+          </a:p>
+        </p:txBody>
+      </p:sp>
+      <p:sp>
+        <p:nvSpPr>
+          <p:cNvPr id="7" name="Rectangle 6">
+            <a:extLst>
+              <a:ext uri="{FF2B5EF4-FFF2-40B4-BE49-F238E27FC236}">
+                <a16:creationId xmlns:a16="http://schemas.microsoft.com/office/drawing/2014/main" id="{D673A9A5-AC5E-4237-A43C-181B9EE178CC}"/>
+              </a:ext>
+            </a:extLst>
+          </p:cNvPr>
+          <p:cNvSpPr/>
+          <p:nvPr/>
+        </p:nvSpPr>
+        <p:spPr>
+          <a:xfrm>
+            <a:off x="656555" y="1701860"/>
+            <a:ext cx="2946662" cy="2946662"/>
+          </a:xfrm>
+          <a:prstGeom prst="rect">
+            <a:avLst/>
+          </a:prstGeom>
+          <a:blipFill dpi="0" rotWithShape="1">
+            <a:blip r:embed="rId3">
+              <a:extLst>
+                <a:ext uri="{28A0092B-C50C-407E-A947-70E740481C1C}">
+                  <a14:useLocalDpi xmlns:a14="http://schemas.microsoft.com/office/drawing/2010/main" val="0"/>
+                </a:ext>
+              </a:extLst>
+            </a:blip>
+            <a:srcRect/>
+            <a:stretch>
+              <a:fillRect/>
+            </a:stretch>
+          </a:blipFill>
+          <a:ln w="19050">
+            <a:solidFill>
+              <a:schemeClr val="tx1"/>
+            </a:solidFill>
+          </a:ln>
+        </p:spPr>
+        <p:style>
+          <a:lnRef idx="2">
+            <a:schemeClr val="accent1">
+              <a:shade val="50000"/>
+            </a:schemeClr>
+          </a:lnRef>
+          <a:fillRef idx="1">
+            <a:schemeClr val="accent1"/>
+          </a:fillRef>
+          <a:effectRef idx="0">
+            <a:schemeClr val="accent1"/>
+          </a:effectRef>
+          <a:fontRef idx="minor">
+            <a:schemeClr val="lt1"/>
+          </a:fontRef>
+        </p:style>
+        <p:txBody>
+          <a:bodyPr rtlCol="0" anchor="ctr"/>
+          <a:lstStyle/>
+          <a:p>
+            <a:pPr algn="ctr"/>
+            <a:endParaRPr lang="en-US"/>
+          </a:p>
+        </p:txBody>
+      </p:sp>
+      <p:sp>
+        <p:nvSpPr>
           <p:cNvPr id="8" name="Rectangle 7">
             <a:extLst>
               <a:ext uri="{FF2B5EF4-FFF2-40B4-BE49-F238E27FC236}">
@@ -3666,6 +3863,198 @@
         <p:spPr>
           <a:xfrm>
             <a:off x="569583" y="1782452"/>
+            <a:ext cx="2946662" cy="2946662"/>
+          </a:xfrm>
+          <a:prstGeom prst="rect">
+            <a:avLst/>
+          </a:prstGeom>
+          <a:blipFill dpi="0" rotWithShape="1">
+            <a:blip r:embed="rId3">
+              <a:extLst>
+                <a:ext uri="{28A0092B-C50C-407E-A947-70E740481C1C}">
+                  <a14:useLocalDpi xmlns:a14="http://schemas.microsoft.com/office/drawing/2010/main" val="0"/>
+                </a:ext>
+              </a:extLst>
+            </a:blip>
+            <a:srcRect/>
+            <a:stretch>
+              <a:fillRect/>
+            </a:stretch>
+          </a:blipFill>
+          <a:ln w="19050">
+            <a:solidFill>
+              <a:schemeClr val="tx1"/>
+            </a:solidFill>
+          </a:ln>
+        </p:spPr>
+        <p:style>
+          <a:lnRef idx="2">
+            <a:schemeClr val="accent1">
+              <a:shade val="50000"/>
+            </a:schemeClr>
+          </a:lnRef>
+          <a:fillRef idx="1">
+            <a:schemeClr val="accent1"/>
+          </a:fillRef>
+          <a:effectRef idx="0">
+            <a:schemeClr val="accent1"/>
+          </a:effectRef>
+          <a:fontRef idx="minor">
+            <a:schemeClr val="lt1"/>
+          </a:fontRef>
+        </p:style>
+        <p:txBody>
+          <a:bodyPr rtlCol="0" anchor="ctr"/>
+          <a:lstStyle/>
+          <a:p>
+            <a:pPr algn="ctr"/>
+            <a:endParaRPr lang="en-US"/>
+          </a:p>
+        </p:txBody>
+      </p:sp>
+      <p:sp>
+        <p:nvSpPr>
+          <p:cNvPr id="9" name="Rectangle 8">
+            <a:extLst>
+              <a:ext uri="{FF2B5EF4-FFF2-40B4-BE49-F238E27FC236}">
+                <a16:creationId xmlns:a16="http://schemas.microsoft.com/office/drawing/2014/main" id="{E818930E-25FB-4D4B-9A6F-2AA7BB0B765A}"/>
+              </a:ext>
+            </a:extLst>
+          </p:cNvPr>
+          <p:cNvSpPr/>
+          <p:nvPr/>
+        </p:nvSpPr>
+        <p:spPr>
+          <a:xfrm>
+            <a:off x="493783" y="1855051"/>
+            <a:ext cx="2946662" cy="2946662"/>
+          </a:xfrm>
+          <a:prstGeom prst="rect">
+            <a:avLst/>
+          </a:prstGeom>
+          <a:blipFill dpi="0" rotWithShape="1">
+            <a:blip r:embed="rId3">
+              <a:extLst>
+                <a:ext uri="{28A0092B-C50C-407E-A947-70E740481C1C}">
+                  <a14:useLocalDpi xmlns:a14="http://schemas.microsoft.com/office/drawing/2010/main" val="0"/>
+                </a:ext>
+              </a:extLst>
+            </a:blip>
+            <a:srcRect/>
+            <a:stretch>
+              <a:fillRect/>
+            </a:stretch>
+          </a:blipFill>
+          <a:ln w="19050">
+            <a:solidFill>
+              <a:schemeClr val="tx1"/>
+            </a:solidFill>
+          </a:ln>
+        </p:spPr>
+        <p:style>
+          <a:lnRef idx="2">
+            <a:schemeClr val="accent1">
+              <a:shade val="50000"/>
+            </a:schemeClr>
+          </a:lnRef>
+          <a:fillRef idx="1">
+            <a:schemeClr val="accent1"/>
+          </a:fillRef>
+          <a:effectRef idx="0">
+            <a:schemeClr val="accent1"/>
+          </a:effectRef>
+          <a:fontRef idx="minor">
+            <a:schemeClr val="lt1"/>
+          </a:fontRef>
+        </p:style>
+        <p:txBody>
+          <a:bodyPr rtlCol="0" anchor="ctr"/>
+          <a:lstStyle/>
+          <a:p>
+            <a:pPr algn="ctr"/>
+            <a:endParaRPr lang="en-US"/>
+          </a:p>
+        </p:txBody>
+      </p:sp>
+      <p:sp>
+        <p:nvSpPr>
+          <p:cNvPr id="10" name="Rectangle 9">
+            <a:extLst>
+              <a:ext uri="{FF2B5EF4-FFF2-40B4-BE49-F238E27FC236}">
+                <a16:creationId xmlns:a16="http://schemas.microsoft.com/office/drawing/2014/main" id="{CC1B72B5-287F-472E-81B6-FFFC7A04589E}"/>
+              </a:ext>
+            </a:extLst>
+          </p:cNvPr>
+          <p:cNvSpPr/>
+          <p:nvPr/>
+        </p:nvSpPr>
+        <p:spPr>
+          <a:xfrm>
+            <a:off x="397237" y="1935643"/>
+            <a:ext cx="2946662" cy="2946662"/>
+          </a:xfrm>
+          <a:prstGeom prst="rect">
+            <a:avLst/>
+          </a:prstGeom>
+          <a:blipFill dpi="0" rotWithShape="1">
+            <a:blip r:embed="rId3">
+              <a:extLst>
+                <a:ext uri="{28A0092B-C50C-407E-A947-70E740481C1C}">
+                  <a14:useLocalDpi xmlns:a14="http://schemas.microsoft.com/office/drawing/2010/main" val="0"/>
+                </a:ext>
+              </a:extLst>
+            </a:blip>
+            <a:srcRect/>
+            <a:stretch>
+              <a:fillRect/>
+            </a:stretch>
+          </a:blipFill>
+          <a:ln w="19050">
+            <a:solidFill>
+              <a:schemeClr val="tx1"/>
+            </a:solidFill>
+          </a:ln>
+        </p:spPr>
+        <p:style>
+          <a:lnRef idx="2">
+            <a:schemeClr val="accent1">
+              <a:shade val="50000"/>
+            </a:schemeClr>
+          </a:lnRef>
+          <a:fillRef idx="1">
+            <a:schemeClr val="accent1"/>
+          </a:fillRef>
+          <a:effectRef idx="0">
+            <a:schemeClr val="accent1"/>
+          </a:effectRef>
+          <a:fontRef idx="minor">
+            <a:schemeClr val="lt1"/>
+          </a:fontRef>
+        </p:style>
+        <p:txBody>
+          <a:bodyPr rtlCol="0" anchor="ctr"/>
+          <a:lstStyle/>
+          <a:p>
+            <a:pPr algn="ctr"/>
+            <a:endParaRPr lang="en-US" dirty="0"/>
+          </a:p>
+        </p:txBody>
+      </p:sp>
+      <p:sp>
+        <p:nvSpPr>
+          <p:cNvPr id="11" name="Rectangle 10">
+            <a:extLst>
+              <a:ext uri="{FF2B5EF4-FFF2-40B4-BE49-F238E27FC236}">
+                <a16:creationId xmlns:a16="http://schemas.microsoft.com/office/drawing/2014/main" id="{DABEAF88-5DD1-4F8B-81D9-EB75F42CC22F}"/>
+              </a:ext>
+            </a:extLst>
+          </p:cNvPr>
+          <p:cNvSpPr/>
+          <p:nvPr/>
+        </p:nvSpPr>
+        <p:spPr>
+          <a:xfrm>
+            <a:off x="6830252" y="1982347"/>
             <a:ext cx="2946662" cy="2946662"/>
           </a:xfrm>
           <a:prstGeom prst="rect">
@@ -3715,200 +4104,8 @@
           </a:p>
         </p:txBody>
       </p:sp>
-      <p:sp>
-        <p:nvSpPr>
-          <p:cNvPr id="9" name="Rectangle 8">
-            <a:extLst>
-              <a:ext uri="{FF2B5EF4-FFF2-40B4-BE49-F238E27FC236}">
-                <a16:creationId xmlns:a16="http://schemas.microsoft.com/office/drawing/2014/main" id="{E818930E-25FB-4D4B-9A6F-2AA7BB0B765A}"/>
-              </a:ext>
-            </a:extLst>
-          </p:cNvPr>
-          <p:cNvSpPr/>
-          <p:nvPr/>
-        </p:nvSpPr>
-        <p:spPr>
-          <a:xfrm>
-            <a:off x="493783" y="1855051"/>
-            <a:ext cx="2946662" cy="2946662"/>
-          </a:xfrm>
-          <a:prstGeom prst="rect">
-            <a:avLst/>
-          </a:prstGeom>
-          <a:blipFill dpi="0" rotWithShape="1">
-            <a:blip r:embed="rId2">
-              <a:extLst>
-                <a:ext uri="{28A0092B-C50C-407E-A947-70E740481C1C}">
-                  <a14:useLocalDpi xmlns:a14="http://schemas.microsoft.com/office/drawing/2010/main" val="0"/>
-                </a:ext>
-              </a:extLst>
-            </a:blip>
-            <a:srcRect/>
-            <a:stretch>
-              <a:fillRect/>
-            </a:stretch>
-          </a:blipFill>
-          <a:ln w="19050">
-            <a:solidFill>
-              <a:schemeClr val="tx1"/>
-            </a:solidFill>
-          </a:ln>
-        </p:spPr>
-        <p:style>
-          <a:lnRef idx="2">
-            <a:schemeClr val="accent1">
-              <a:shade val="50000"/>
-            </a:schemeClr>
-          </a:lnRef>
-          <a:fillRef idx="1">
-            <a:schemeClr val="accent1"/>
-          </a:fillRef>
-          <a:effectRef idx="0">
-            <a:schemeClr val="accent1"/>
-          </a:effectRef>
-          <a:fontRef idx="minor">
-            <a:schemeClr val="lt1"/>
-          </a:fontRef>
-        </p:style>
-        <p:txBody>
-          <a:bodyPr rtlCol="0" anchor="ctr"/>
-          <a:lstStyle/>
-          <a:p>
-            <a:pPr algn="ctr"/>
-            <a:endParaRPr lang="en-US"/>
-          </a:p>
-        </p:txBody>
-      </p:sp>
-      <p:sp>
-        <p:nvSpPr>
-          <p:cNvPr id="10" name="Rectangle 9">
-            <a:extLst>
-              <a:ext uri="{FF2B5EF4-FFF2-40B4-BE49-F238E27FC236}">
-                <a16:creationId xmlns:a16="http://schemas.microsoft.com/office/drawing/2014/main" id="{CC1B72B5-287F-472E-81B6-FFFC7A04589E}"/>
-              </a:ext>
-            </a:extLst>
-          </p:cNvPr>
-          <p:cNvSpPr/>
-          <p:nvPr/>
-        </p:nvSpPr>
-        <p:spPr>
-          <a:xfrm>
-            <a:off x="397237" y="1935643"/>
-            <a:ext cx="2946662" cy="2946662"/>
-          </a:xfrm>
-          <a:prstGeom prst="rect">
-            <a:avLst/>
-          </a:prstGeom>
-          <a:blipFill dpi="0" rotWithShape="1">
-            <a:blip r:embed="rId2">
-              <a:extLst>
-                <a:ext uri="{28A0092B-C50C-407E-A947-70E740481C1C}">
-                  <a14:useLocalDpi xmlns:a14="http://schemas.microsoft.com/office/drawing/2010/main" val="0"/>
-                </a:ext>
-              </a:extLst>
-            </a:blip>
-            <a:srcRect/>
-            <a:stretch>
-              <a:fillRect/>
-            </a:stretch>
-          </a:blipFill>
-          <a:ln w="19050">
-            <a:solidFill>
-              <a:schemeClr val="tx1"/>
-            </a:solidFill>
-          </a:ln>
-        </p:spPr>
-        <p:style>
-          <a:lnRef idx="2">
-            <a:schemeClr val="accent1">
-              <a:shade val="50000"/>
-            </a:schemeClr>
-          </a:lnRef>
-          <a:fillRef idx="1">
-            <a:schemeClr val="accent1"/>
-          </a:fillRef>
-          <a:effectRef idx="0">
-            <a:schemeClr val="accent1"/>
-          </a:effectRef>
-          <a:fontRef idx="minor">
-            <a:schemeClr val="lt1"/>
-          </a:fontRef>
-        </p:style>
-        <p:txBody>
-          <a:bodyPr rtlCol="0" anchor="ctr"/>
-          <a:lstStyle/>
-          <a:p>
-            <a:pPr algn="ctr"/>
-            <a:endParaRPr lang="en-US"/>
-          </a:p>
-        </p:txBody>
-      </p:sp>
-      <p:sp>
-        <p:nvSpPr>
-          <p:cNvPr id="11" name="Rectangle 10">
-            <a:extLst>
-              <a:ext uri="{FF2B5EF4-FFF2-40B4-BE49-F238E27FC236}">
-                <a16:creationId xmlns:a16="http://schemas.microsoft.com/office/drawing/2014/main" id="{DABEAF88-5DD1-4F8B-81D9-EB75F42CC22F}"/>
-              </a:ext>
-            </a:extLst>
-          </p:cNvPr>
-          <p:cNvSpPr/>
-          <p:nvPr/>
-        </p:nvSpPr>
-        <p:spPr>
-          <a:xfrm>
-            <a:off x="6958840" y="1758512"/>
-            <a:ext cx="2946662" cy="2946662"/>
-          </a:xfrm>
-          <a:prstGeom prst="rect">
-            <a:avLst/>
-          </a:prstGeom>
-          <a:blipFill dpi="0" rotWithShape="1">
-            <a:blip r:embed="rId3">
-              <a:extLst>
-                <a:ext uri="{28A0092B-C50C-407E-A947-70E740481C1C}">
-                  <a14:useLocalDpi xmlns:a14="http://schemas.microsoft.com/office/drawing/2010/main" val="0"/>
-                </a:ext>
-              </a:extLst>
-            </a:blip>
-            <a:srcRect/>
-            <a:stretch>
-              <a:fillRect/>
-            </a:stretch>
-          </a:blipFill>
-          <a:ln w="19050">
-            <a:solidFill>
-              <a:schemeClr val="tx1"/>
-            </a:solidFill>
-          </a:ln>
-        </p:spPr>
-        <p:style>
-          <a:lnRef idx="2">
-            <a:schemeClr val="accent1">
-              <a:shade val="50000"/>
-            </a:schemeClr>
-          </a:lnRef>
-          <a:fillRef idx="1">
-            <a:schemeClr val="accent1"/>
-          </a:fillRef>
-          <a:effectRef idx="0">
-            <a:schemeClr val="accent1"/>
-          </a:effectRef>
-          <a:fontRef idx="minor">
-            <a:schemeClr val="lt1"/>
-          </a:fontRef>
-        </p:style>
-        <p:txBody>
-          <a:bodyPr rtlCol="0" anchor="ctr"/>
-          <a:lstStyle/>
-          <a:p>
-            <a:pPr algn="ctr"/>
-            <a:endParaRPr lang="en-US"/>
-          </a:p>
-        </p:txBody>
-      </p:sp>
-      <mc:AlternateContent xmlns:mc="http://schemas.openxmlformats.org/markup-compatibility/2006">
-        <mc:Choice xmlns:a14="http://schemas.microsoft.com/office/drawing/2010/main" Requires="a14">
+      <mc:AlternateContent xmlns:mc="http://schemas.openxmlformats.org/markup-compatibility/2006" xmlns:a14="http://schemas.microsoft.com/office/drawing/2010/main">
+        <mc:Choice Requires="a14">
           <p:sp>
             <p:nvSpPr>
               <p:cNvPr id="12" name="TextBox 11">
@@ -3937,6 +4134,7 @@
               </a:bodyPr>
               <a:lstStyle/>
               <a:p>
+                <a:pPr/>
                 <a14:m>
                   <m:oMathPara xmlns:m="http://schemas.openxmlformats.org/officeDocument/2006/math">
                     <m:oMathParaPr>
@@ -3963,7 +4161,7 @@
             </p:txBody>
           </p:sp>
         </mc:Choice>
-        <mc:Fallback>
+        <mc:Fallback xmlns="">
           <p:sp>
             <p:nvSpPr>
               <p:cNvPr id="12" name="TextBox 11">
@@ -4008,8 +4206,8 @@
           </p:sp>
         </mc:Fallback>
       </mc:AlternateContent>
-      <mc:AlternateContent xmlns:mc="http://schemas.openxmlformats.org/markup-compatibility/2006">
-        <mc:Choice xmlns:a14="http://schemas.microsoft.com/office/drawing/2010/main" Requires="a14">
+      <mc:AlternateContent xmlns:mc="http://schemas.openxmlformats.org/markup-compatibility/2006" xmlns:a14="http://schemas.microsoft.com/office/drawing/2010/main">
+        <mc:Choice Requires="a14">
           <p:sp>
             <p:nvSpPr>
               <p:cNvPr id="14" name="TextBox 13">
@@ -4038,6 +4236,7 @@
               </a:bodyPr>
               <a:lstStyle/>
               <a:p>
+                <a:pPr/>
                 <a14:m>
                   <m:oMathPara xmlns:m="http://schemas.openxmlformats.org/officeDocument/2006/math">
                     <m:oMathParaPr>
@@ -4064,7 +4263,7 @@
             </p:txBody>
           </p:sp>
         </mc:Choice>
-        <mc:Fallback>
+        <mc:Fallback xmlns="">
           <p:sp>
             <p:nvSpPr>
               <p:cNvPr id="14" name="TextBox 13">
@@ -4109,8 +4308,8 @@
           </p:sp>
         </mc:Fallback>
       </mc:AlternateContent>
-      <mc:AlternateContent xmlns:mc="http://schemas.openxmlformats.org/markup-compatibility/2006">
-        <mc:Choice xmlns:a14="http://schemas.microsoft.com/office/drawing/2010/main" Requires="a14">
+      <mc:AlternateContent xmlns:mc="http://schemas.openxmlformats.org/markup-compatibility/2006" xmlns:a14="http://schemas.microsoft.com/office/drawing/2010/main">
+        <mc:Choice Requires="a14">
           <p:sp>
             <p:nvSpPr>
               <p:cNvPr id="15" name="TextBox 14">
@@ -4125,7 +4324,7 @@
             </p:nvSpPr>
             <p:spPr>
               <a:xfrm>
-                <a:off x="9556833" y="4733632"/>
+                <a:off x="9704476" y="4819364"/>
                 <a:ext cx="605039" cy="369332"/>
               </a:xfrm>
               <a:prstGeom prst="rect">
@@ -4139,6 +4338,7 @@
               </a:bodyPr>
               <a:lstStyle/>
               <a:p>
+                <a:pPr/>
                 <a14:m>
                   <m:oMathPara xmlns:m="http://schemas.openxmlformats.org/officeDocument/2006/math">
                     <m:oMathParaPr>
@@ -4159,7 +4359,7 @@
             </p:txBody>
           </p:sp>
         </mc:Choice>
-        <mc:Fallback>
+        <mc:Fallback xmlns="">
           <p:sp>
             <p:nvSpPr>
               <p:cNvPr id="15" name="TextBox 14">
@@ -4176,7 +4376,7 @@
             </p:nvSpPr>
             <p:spPr>
               <a:xfrm>
-                <a:off x="9556833" y="4733632"/>
+                <a:off x="9704476" y="4819364"/>
                 <a:ext cx="605039" cy="369332"/>
               </a:xfrm>
               <a:prstGeom prst="rect">
@@ -4235,7 +4435,7 @@
             <a:pPr algn="ctr"/>
             <a:r>
               <a:rPr lang="en-US" dirty="0"/>
-              <a:t>Input</a:t>
+              <a:t>Input (50 x 50 patches)</a:t>
             </a:r>
           </a:p>
         </p:txBody>
@@ -4271,7 +4471,7 @@
             <a:pPr algn="ctr"/>
             <a:r>
               <a:rPr lang="en-US" dirty="0"/>
-              <a:t>Prediction</a:t>
+              <a:t>Prediction (50 x 50 patches)</a:t>
             </a:r>
           </a:p>
         </p:txBody>
@@ -4428,7 +4628,7 @@
         </p:nvSpPr>
         <p:spPr>
           <a:xfrm>
-            <a:off x="3640667" y="1848023"/>
+            <a:off x="3498432" y="1635030"/>
             <a:ext cx="3369549" cy="369332"/>
           </a:xfrm>
           <a:prstGeom prst="rect">
@@ -4445,7 +4645,7 @@
             <a:pPr algn="ctr"/>
             <a:r>
               <a:rPr lang="en-US" dirty="0"/>
-              <a:t>5x5 Convolutions </a:t>
+              <a:t>Convolutions </a:t>
             </a:r>
           </a:p>
         </p:txBody>
@@ -4464,7 +4664,7 @@
         </p:nvSpPr>
         <p:spPr>
           <a:xfrm>
-            <a:off x="2051796" y="3619013"/>
+            <a:off x="440228" y="1979419"/>
             <a:ext cx="1162078" cy="1162078"/>
           </a:xfrm>
           <a:prstGeom prst="rect">
@@ -4510,9 +4710,9 @@
           <p:nvPr/>
         </p:nvCxnSpPr>
         <p:spPr>
-          <a:xfrm flipV="1">
-            <a:off x="3195376" y="2971800"/>
-            <a:ext cx="1446757" cy="665396"/>
+          <a:xfrm>
+            <a:off x="1602306" y="1979419"/>
+            <a:ext cx="3039827" cy="992381"/>
           </a:xfrm>
           <a:prstGeom prst="line">
             <a:avLst/>
@@ -4549,8 +4749,8 @@
         </p:nvCxnSpPr>
         <p:spPr>
           <a:xfrm flipV="1">
-            <a:off x="3212131" y="3101999"/>
-            <a:ext cx="1415546" cy="1669288"/>
+            <a:off x="1602306" y="3101999"/>
+            <a:ext cx="3025371" cy="39498"/>
           </a:xfrm>
           <a:prstGeom prst="line">
             <a:avLst/>
@@ -4586,9 +4786,9 @@
           <p:nvPr/>
         </p:nvCxnSpPr>
         <p:spPr>
-          <a:xfrm flipV="1">
-            <a:off x="2042914" y="2984618"/>
-            <a:ext cx="2453447" cy="652576"/>
+          <a:xfrm>
+            <a:off x="440228" y="1979419"/>
+            <a:ext cx="4056133" cy="1005199"/>
           </a:xfrm>
           <a:prstGeom prst="line">
             <a:avLst/>
@@ -4655,6 +4855,99 @@
           </a:p>
         </p:txBody>
       </p:sp>
+      <mc:AlternateContent xmlns:mc="http://schemas.openxmlformats.org/markup-compatibility/2006" xmlns:a14="http://schemas.microsoft.com/office/drawing/2010/main">
+        <mc:Choice Requires="a14">
+          <p:sp>
+            <p:nvSpPr>
+              <p:cNvPr id="34" name="TextBox 33">
+                <a:extLst>
+                  <a:ext uri="{FF2B5EF4-FFF2-40B4-BE49-F238E27FC236}">
+                    <a16:creationId xmlns:a16="http://schemas.microsoft.com/office/drawing/2014/main" id="{F8C39B86-3FCE-486E-9F63-F5CD39670DD4}"/>
+                  </a:ext>
+                </a:extLst>
+              </p:cNvPr>
+              <p:cNvSpPr txBox="1"/>
+              <p:nvPr/>
+            </p:nvSpPr>
+            <p:spPr>
+              <a:xfrm>
+                <a:off x="10266462" y="4428826"/>
+                <a:ext cx="1185791" cy="369332"/>
+              </a:xfrm>
+              <a:prstGeom prst="rect">
+                <a:avLst/>
+              </a:prstGeom>
+              <a:noFill/>
+            </p:spPr>
+            <p:txBody>
+              <a:bodyPr wrap="square" rtlCol="0">
+                <a:spAutoFit/>
+              </a:bodyPr>
+              <a:lstStyle/>
+              <a:p>
+                <a14:m>
+                  <m:oMath xmlns:m="http://schemas.openxmlformats.org/officeDocument/2006/math">
+                    <m:r>
+                      <a:rPr lang="en-US" i="1" dirty="0" smtClean="0">
+                        <a:latin typeface="Cambria Math" panose="02040503050406030204" pitchFamily="18" charset="0"/>
+                      </a:rPr>
+                      <m:t>𝑡</m:t>
+                    </m:r>
+                  </m:oMath>
+                </a14:m>
+                <a:r>
+                  <a:rPr lang="en-US" dirty="0"/>
+                  <a:t>+20</a:t>
+                </a:r>
+              </a:p>
+            </p:txBody>
+          </p:sp>
+        </mc:Choice>
+        <mc:Fallback xmlns="">
+          <p:sp>
+            <p:nvSpPr>
+              <p:cNvPr id="34" name="TextBox 33">
+                <a:extLst>
+                  <a:ext uri="{FF2B5EF4-FFF2-40B4-BE49-F238E27FC236}">
+                    <a16:creationId xmlns:a16="http://schemas.microsoft.com/office/drawing/2014/main" id="{F8C39B86-3FCE-486E-9F63-F5CD39670DD4}"/>
+                  </a:ext>
+                </a:extLst>
+              </p:cNvPr>
+              <p:cNvSpPr txBox="1">
+                <a:spLocks noRot="1" noChangeAspect="1" noMove="1" noResize="1" noEditPoints="1" noAdjustHandles="1" noChangeArrowheads="1" noChangeShapeType="1" noTextEdit="1"/>
+              </p:cNvSpPr>
+              <p:nvPr/>
+            </p:nvSpPr>
+            <p:spPr>
+              <a:xfrm>
+                <a:off x="10266462" y="4428826"/>
+                <a:ext cx="1185791" cy="369332"/>
+              </a:xfrm>
+              <a:prstGeom prst="rect">
+                <a:avLst/>
+              </a:prstGeom>
+              <a:blipFill>
+                <a:blip r:embed="rId7"/>
+                <a:stretch>
+                  <a:fillRect t="-10000" b="-26667"/>
+                </a:stretch>
+              </a:blipFill>
+            </p:spPr>
+            <p:txBody>
+              <a:bodyPr/>
+              <a:lstStyle/>
+              <a:p>
+                <a:r>
+                  <a:rPr lang="en-US">
+                    <a:noFill/>
+                  </a:rPr>
+                  <a:t> </a:t>
+                </a:r>
+              </a:p>
+            </p:txBody>
+          </p:sp>
+        </mc:Fallback>
+      </mc:AlternateContent>
     </p:spTree>
     <p:extLst>
       <p:ext uri="{BB962C8B-B14F-4D97-AF65-F5344CB8AC3E}">

</xml_diff>